<commit_message>
Update Lesson 2 (Add Installing Python & Python IDE)
</commit_message>
<xml_diff>
--- a/Lesson 2.pptx
+++ b/Lesson 2.pptx
@@ -222,7 +222,7 @@
           <a:effectLst/>
           <a:extLst>
             <a:ext uri="{91240B29-F687-4f45-9708-019B960494DF}">
-              <a14:hiddenLine xmlns="" xmlns:a14="http://schemas.microsoft.com/office/drawing/2010/main" w="9525">
+              <a14:hiddenLine xmlns:a14="http://schemas.microsoft.com/office/drawing/2010/main" xmlns="" w="9525">
                 <a:solidFill>
                   <a:srgbClr val="000000"/>
                 </a:solidFill>
@@ -414,7 +414,7 @@
           <a:p>
             <a:fld id="{E3F9F15C-9FA5-4B24-A444-6CBA1B0D85B9}" type="datetimeFigureOut">
               <a:rPr lang="en-US" smtClean="0"/>
-              <a:t>1/31/2024</a:t>
+              <a:t>2/2/2024</a:t>
             </a:fld>
             <a:endParaRPr lang="en-US"/>
           </a:p>
@@ -732,7 +732,7 @@
           <a:p>
             <a:fld id="{E3F9F15C-9FA5-4B24-A444-6CBA1B0D85B9}" type="datetimeFigureOut">
               <a:rPr lang="en-US" smtClean="0"/>
-              <a:t>1/31/2024</a:t>
+              <a:t>2/2/2024</a:t>
             </a:fld>
             <a:endParaRPr lang="en-US"/>
           </a:p>
@@ -1220,7 +1220,7 @@
           <a:p>
             <a:fld id="{E3F9F15C-9FA5-4B24-A444-6CBA1B0D85B9}" type="datetimeFigureOut">
               <a:rPr lang="en-US" smtClean="0"/>
-              <a:t>1/31/2024</a:t>
+              <a:t>2/2/2024</a:t>
             </a:fld>
             <a:endParaRPr lang="en-US"/>
           </a:p>
@@ -1589,7 +1589,7 @@
           <a:p>
             <a:fld id="{E3F9F15C-9FA5-4B24-A444-6CBA1B0D85B9}" type="datetimeFigureOut">
               <a:rPr lang="en-US" smtClean="0"/>
-              <a:t>1/31/2024</a:t>
+              <a:t>2/2/2024</a:t>
             </a:fld>
             <a:endParaRPr lang="en-US"/>
           </a:p>
@@ -1744,7 +1744,7 @@
           <a:ln/>
           <a:extLst>
             <a:ext uri="{91240B29-F687-4f45-9708-019B960494DF}">
-              <a14:hiddenLine xmlns="" xmlns:a14="http://schemas.microsoft.com/office/drawing/2010/main" w="9525">
+              <a14:hiddenLine xmlns:a14="http://schemas.microsoft.com/office/drawing/2010/main" xmlns="" w="9525">
                 <a:solidFill>
                   <a:srgbClr val="000000"/>
                 </a:solidFill>
@@ -1862,7 +1862,7 @@
           <a:p>
             <a:fld id="{E3F9F15C-9FA5-4B24-A444-6CBA1B0D85B9}" type="datetimeFigureOut">
               <a:rPr lang="en-US" smtClean="0"/>
-              <a:t>1/31/2024</a:t>
+              <a:t>2/2/2024</a:t>
             </a:fld>
             <a:endParaRPr lang="en-US"/>
           </a:p>
@@ -2019,7 +2019,7 @@
           <a:ln/>
           <a:extLst>
             <a:ext uri="{91240B29-F687-4f45-9708-019B960494DF}">
-              <a14:hiddenLine xmlns="" xmlns:a14="http://schemas.microsoft.com/office/drawing/2010/main" w="9525">
+              <a14:hiddenLine xmlns:a14="http://schemas.microsoft.com/office/drawing/2010/main" xmlns="" w="9525">
                 <a:solidFill>
                   <a:srgbClr val="000000"/>
                 </a:solidFill>
@@ -2147,7 +2147,7 @@
           <a:p>
             <a:fld id="{E3F9F15C-9FA5-4B24-A444-6CBA1B0D85B9}" type="datetimeFigureOut">
               <a:rPr lang="en-US" smtClean="0"/>
-              <a:t>1/31/2024</a:t>
+              <a:t>2/2/2024</a:t>
             </a:fld>
             <a:endParaRPr lang="en-US"/>
           </a:p>
@@ -2302,7 +2302,7 @@
           <a:ln/>
           <a:extLst>
             <a:ext uri="{91240B29-F687-4f45-9708-019B960494DF}">
-              <a14:hiddenLine xmlns="" xmlns:a14="http://schemas.microsoft.com/office/drawing/2010/main" w="9525">
+              <a14:hiddenLine xmlns:a14="http://schemas.microsoft.com/office/drawing/2010/main" xmlns="" w="9525">
                 <a:solidFill>
                   <a:srgbClr val="000000"/>
                 </a:solidFill>
@@ -2430,7 +2430,7 @@
           <a:p>
             <a:fld id="{E3F9F15C-9FA5-4B24-A444-6CBA1B0D85B9}" type="datetimeFigureOut">
               <a:rPr lang="en-US" smtClean="0"/>
-              <a:t>1/31/2024</a:t>
+              <a:t>2/2/2024</a:t>
             </a:fld>
             <a:endParaRPr lang="en-US"/>
           </a:p>
@@ -2773,7 +2773,7 @@
           <a:p>
             <a:fld id="{E3F9F15C-9FA5-4B24-A444-6CBA1B0D85B9}" type="datetimeFigureOut">
               <a:rPr lang="en-US" smtClean="0"/>
-              <a:t>1/31/2024</a:t>
+              <a:t>2/2/2024</a:t>
             </a:fld>
             <a:endParaRPr lang="en-US"/>
           </a:p>
@@ -2928,7 +2928,7 @@
           <a:ln/>
           <a:extLst>
             <a:ext uri="{91240B29-F687-4f45-9708-019B960494DF}">
-              <a14:hiddenLine xmlns="" xmlns:a14="http://schemas.microsoft.com/office/drawing/2010/main" w="9525">
+              <a14:hiddenLine xmlns:a14="http://schemas.microsoft.com/office/drawing/2010/main" xmlns="" w="9525">
                 <a:solidFill>
                   <a:srgbClr val="000000"/>
                 </a:solidFill>
@@ -3112,7 +3112,7 @@
           <a:p>
             <a:fld id="{E3F9F15C-9FA5-4B24-A444-6CBA1B0D85B9}" type="datetimeFigureOut">
               <a:rPr lang="en-US" smtClean="0"/>
-              <a:t>1/31/2024</a:t>
+              <a:t>2/2/2024</a:t>
             </a:fld>
             <a:endParaRPr lang="en-US"/>
           </a:p>
@@ -3267,7 +3267,7 @@
           <a:ln/>
           <a:extLst>
             <a:ext uri="{91240B29-F687-4f45-9708-019B960494DF}">
-              <a14:hiddenLine xmlns="" xmlns:a14="http://schemas.microsoft.com/office/drawing/2010/main" w="9525">
+              <a14:hiddenLine xmlns:a14="http://schemas.microsoft.com/office/drawing/2010/main" xmlns="" w="9525">
                 <a:solidFill>
                   <a:srgbClr val="000000"/>
                 </a:solidFill>
@@ -3589,7 +3589,7 @@
           <a:p>
             <a:fld id="{E3F9F15C-9FA5-4B24-A444-6CBA1B0D85B9}" type="datetimeFigureOut">
               <a:rPr lang="en-US" smtClean="0"/>
-              <a:t>1/31/2024</a:t>
+              <a:t>2/2/2024</a:t>
             </a:fld>
             <a:endParaRPr lang="en-US"/>
           </a:p>
@@ -3744,7 +3744,7 @@
           <a:ln/>
           <a:extLst>
             <a:ext uri="{91240B29-F687-4f45-9708-019B960494DF}">
-              <a14:hiddenLine xmlns="" xmlns:a14="http://schemas.microsoft.com/office/drawing/2010/main" w="9525">
+              <a14:hiddenLine xmlns:a14="http://schemas.microsoft.com/office/drawing/2010/main" xmlns="" w="9525">
                 <a:solidFill>
                   <a:srgbClr val="000000"/>
                 </a:solidFill>
@@ -3810,7 +3810,7 @@
           <a:p>
             <a:fld id="{E3F9F15C-9FA5-4B24-A444-6CBA1B0D85B9}" type="datetimeFigureOut">
               <a:rPr lang="en-US" smtClean="0"/>
-              <a:t>1/31/2024</a:t>
+              <a:t>2/2/2024</a:t>
             </a:fld>
             <a:endParaRPr lang="en-US"/>
           </a:p>
@@ -3905,7 +3905,7 @@
           <a:p>
             <a:fld id="{E3F9F15C-9FA5-4B24-A444-6CBA1B0D85B9}" type="datetimeFigureOut">
               <a:rPr lang="en-US" smtClean="0"/>
-              <a:t>1/31/2024</a:t>
+              <a:t>2/2/2024</a:t>
             </a:fld>
             <a:endParaRPr lang="en-US"/>
           </a:p>
@@ -4173,7 +4173,7 @@
           <a:ln/>
           <a:extLst>
             <a:ext uri="{91240B29-F687-4f45-9708-019B960494DF}">
-              <a14:hiddenLine xmlns="" xmlns:a14="http://schemas.microsoft.com/office/drawing/2010/main" w="9525">
+              <a14:hiddenLine xmlns:a14="http://schemas.microsoft.com/office/drawing/2010/main" xmlns="" w="9525">
                 <a:solidFill>
                   <a:srgbClr val="000000"/>
                 </a:solidFill>
@@ -4372,7 +4372,7 @@
           <a:p>
             <a:fld id="{E3F9F15C-9FA5-4B24-A444-6CBA1B0D85B9}" type="datetimeFigureOut">
               <a:rPr lang="en-US" smtClean="0"/>
-              <a:t>1/31/2024</a:t>
+              <a:t>2/2/2024</a:t>
             </a:fld>
             <a:endParaRPr lang="en-US"/>
           </a:p>
@@ -4685,7 +4685,7 @@
           <a:p>
             <a:fld id="{E3F9F15C-9FA5-4B24-A444-6CBA1B0D85B9}" type="datetimeFigureOut">
               <a:rPr lang="en-US" smtClean="0"/>
-              <a:t>1/31/2024</a:t>
+              <a:t>2/2/2024</a:t>
             </a:fld>
             <a:endParaRPr lang="en-US"/>
           </a:p>
@@ -4955,7 +4955,7 @@
           <a:p>
             <a:fld id="{E3F9F15C-9FA5-4B24-A444-6CBA1B0D85B9}" type="datetimeFigureOut">
               <a:rPr lang="en-US" smtClean="0"/>
-              <a:t>1/31/2024</a:t>
+              <a:t>2/2/2024</a:t>
             </a:fld>
             <a:endParaRPr lang="en-US"/>
           </a:p>
@@ -5758,8 +5758,15 @@
             </a:pPr>
             <a:r>
               <a:rPr lang="en-US" dirty="0"/>
-              <a:t>3.1. Installing Python</a:t>
-            </a:r>
+              <a:t>3.1. </a:t>
+            </a:r>
+            <a:r>
+              <a:rPr lang="en-US" dirty="0">
+                <a:hlinkClick r:id="rId2"/>
+              </a:rPr>
+              <a:t>Installing Python</a:t>
+            </a:r>
+            <a:endParaRPr lang="en-US" dirty="0"/>
           </a:p>
           <a:p>
             <a:pPr marL="0" indent="0">
@@ -5773,8 +5780,15 @@
             </a:pPr>
             <a:r>
               <a:rPr lang="en-US" dirty="0"/>
-              <a:t>3.2. Python IDE</a:t>
-            </a:r>
+              <a:t>3.2. </a:t>
+            </a:r>
+            <a:r>
+              <a:rPr lang="en-US" dirty="0">
+                <a:hlinkClick r:id="rId3"/>
+              </a:rPr>
+              <a:t>Python IDE (PyCharm)</a:t>
+            </a:r>
+            <a:endParaRPr lang="en-US" dirty="0"/>
           </a:p>
         </p:txBody>
       </p:sp>

</xml_diff>